<commit_message>
end of fall 2023 semester
</commit_message>
<xml_diff>
--- a/Slides/PH223_Lecture_47.pptx
+++ b/Slides/PH223_Lecture_47.pptx
@@ -6,12 +6,12 @@
   </p:sldMasterIdLst>
   <p:sldIdLst>
     <p:sldId id="257" r:id="rId2"/>
-    <p:sldId id="1200" r:id="rId3"/>
-    <p:sldId id="1347" r:id="rId4"/>
-    <p:sldId id="1363" r:id="rId5"/>
-    <p:sldId id="1201" r:id="rId6"/>
-    <p:sldId id="1202" r:id="rId7"/>
-    <p:sldId id="262" r:id="rId8"/>
+    <p:sldId id="262" r:id="rId3"/>
+    <p:sldId id="1200" r:id="rId4"/>
+    <p:sldId id="1347" r:id="rId5"/>
+    <p:sldId id="1363" r:id="rId6"/>
+    <p:sldId id="1201" r:id="rId7"/>
+    <p:sldId id="1202" r:id="rId8"/>
     <p:sldId id="261" r:id="rId9"/>
     <p:sldId id="263" r:id="rId10"/>
     <p:sldId id="271" r:id="rId11"/>
@@ -162,10 +162,17 @@
   <pc:docChgLst>
     <pc:chgData name="Lines, Todd" userId="afaf7c3a-e8aa-4568-882a-02ad8f9e19b0" providerId="ADAL" clId="{7FDE54D0-7540-40D1-B7AF-190AEBC0F0E5}"/>
     <pc:docChg chg="addSld modSld sldOrd">
-      <pc:chgData name="Lines, Todd" userId="afaf7c3a-e8aa-4568-882a-02ad8f9e19b0" providerId="ADAL" clId="{7FDE54D0-7540-40D1-B7AF-190AEBC0F0E5}" dt="2023-12-01T22:52:23.372" v="10"/>
+      <pc:chgData name="Lines, Todd" userId="afaf7c3a-e8aa-4568-882a-02ad8f9e19b0" providerId="ADAL" clId="{7FDE54D0-7540-40D1-B7AF-190AEBC0F0E5}" dt="2023-12-04T22:07:58.726" v="12"/>
       <pc:docMkLst>
         <pc:docMk/>
       </pc:docMkLst>
+      <pc:sldChg chg="ord">
+        <pc:chgData name="Lines, Todd" userId="afaf7c3a-e8aa-4568-882a-02ad8f9e19b0" providerId="ADAL" clId="{7FDE54D0-7540-40D1-B7AF-190AEBC0F0E5}" dt="2023-12-04T22:07:58.726" v="12"/>
+        <pc:sldMkLst>
+          <pc:docMk/>
+          <pc:sldMk cId="0" sldId="262"/>
+        </pc:sldMkLst>
+      </pc:sldChg>
       <pc:sldChg chg="add ord">
         <pc:chgData name="Lines, Todd" userId="afaf7c3a-e8aa-4568-882a-02ad8f9e19b0" providerId="ADAL" clId="{7FDE54D0-7540-40D1-B7AF-190AEBC0F0E5}" dt="2023-12-01T22:29:25.483" v="2"/>
         <pc:sldMkLst>
@@ -421,7 +428,7 @@
             <a:fld id="{E2C1E359-9639-405C-8C91-EB2B194AA000}" type="datetimeFigureOut">
               <a:rPr lang="en-US" smtClean="0"/>
               <a:pPr/>
-              <a:t>12/1/2023</a:t>
+              <a:t>12/4/2023</a:t>
             </a:fld>
             <a:endParaRPr lang="en-US"/>
           </a:p>
@@ -586,7 +593,7 @@
             <a:fld id="{E2C1E359-9639-405C-8C91-EB2B194AA000}" type="datetimeFigureOut">
               <a:rPr lang="en-US" smtClean="0"/>
               <a:pPr/>
-              <a:t>12/1/2023</a:t>
+              <a:t>12/4/2023</a:t>
             </a:fld>
             <a:endParaRPr lang="en-US"/>
           </a:p>
@@ -761,7 +768,7 @@
             <a:fld id="{E2C1E359-9639-405C-8C91-EB2B194AA000}" type="datetimeFigureOut">
               <a:rPr lang="en-US" smtClean="0"/>
               <a:pPr/>
-              <a:t>12/1/2023</a:t>
+              <a:t>12/4/2023</a:t>
             </a:fld>
             <a:endParaRPr lang="en-US"/>
           </a:p>
@@ -926,7 +933,7 @@
             <a:fld id="{E2C1E359-9639-405C-8C91-EB2B194AA000}" type="datetimeFigureOut">
               <a:rPr lang="en-US" smtClean="0"/>
               <a:pPr/>
-              <a:t>12/1/2023</a:t>
+              <a:t>12/4/2023</a:t>
             </a:fld>
             <a:endParaRPr lang="en-US"/>
           </a:p>
@@ -1168,7 +1175,7 @@
             <a:fld id="{E2C1E359-9639-405C-8C91-EB2B194AA000}" type="datetimeFigureOut">
               <a:rPr lang="en-US" smtClean="0"/>
               <a:pPr/>
-              <a:t>12/1/2023</a:t>
+              <a:t>12/4/2023</a:t>
             </a:fld>
             <a:endParaRPr lang="en-US"/>
           </a:p>
@@ -1450,7 +1457,7 @@
             <a:fld id="{E2C1E359-9639-405C-8C91-EB2B194AA000}" type="datetimeFigureOut">
               <a:rPr lang="en-US" smtClean="0"/>
               <a:pPr/>
-              <a:t>12/1/2023</a:t>
+              <a:t>12/4/2023</a:t>
             </a:fld>
             <a:endParaRPr lang="en-US"/>
           </a:p>
@@ -1866,7 +1873,7 @@
             <a:fld id="{E2C1E359-9639-405C-8C91-EB2B194AA000}" type="datetimeFigureOut">
               <a:rPr lang="en-US" smtClean="0"/>
               <a:pPr/>
-              <a:t>12/1/2023</a:t>
+              <a:t>12/4/2023</a:t>
             </a:fld>
             <a:endParaRPr lang="en-US"/>
           </a:p>
@@ -1980,7 +1987,7 @@
             <a:fld id="{E2C1E359-9639-405C-8C91-EB2B194AA000}" type="datetimeFigureOut">
               <a:rPr lang="en-US" smtClean="0"/>
               <a:pPr/>
-              <a:t>12/1/2023</a:t>
+              <a:t>12/4/2023</a:t>
             </a:fld>
             <a:endParaRPr lang="en-US"/>
           </a:p>
@@ -2072,7 +2079,7 @@
             <a:fld id="{E2C1E359-9639-405C-8C91-EB2B194AA000}" type="datetimeFigureOut">
               <a:rPr lang="en-US" smtClean="0"/>
               <a:pPr/>
-              <a:t>12/1/2023</a:t>
+              <a:t>12/4/2023</a:t>
             </a:fld>
             <a:endParaRPr lang="en-US"/>
           </a:p>
@@ -2344,7 +2351,7 @@
             <a:fld id="{E2C1E359-9639-405C-8C91-EB2B194AA000}" type="datetimeFigureOut">
               <a:rPr lang="en-US" smtClean="0"/>
               <a:pPr/>
-              <a:t>12/1/2023</a:t>
+              <a:t>12/4/2023</a:t>
             </a:fld>
             <a:endParaRPr lang="en-US"/>
           </a:p>
@@ -2593,7 +2600,7 @@
             <a:fld id="{E2C1E359-9639-405C-8C91-EB2B194AA000}" type="datetimeFigureOut">
               <a:rPr lang="en-US" smtClean="0"/>
               <a:pPr/>
-              <a:t>12/1/2023</a:t>
+              <a:t>12/4/2023</a:t>
             </a:fld>
             <a:endParaRPr lang="en-US"/>
           </a:p>
@@ -2801,7 +2808,7 @@
             <a:fld id="{E2C1E359-9639-405C-8C91-EB2B194AA000}" type="datetimeFigureOut">
               <a:rPr lang="en-US" smtClean="0"/>
               <a:pPr/>
-              <a:t>12/1/2023</a:t>
+              <a:t>12/4/2023</a:t>
             </a:fld>
             <a:endParaRPr lang="en-US"/>
           </a:p>
@@ -17274,144 +17281,1030 @@
       </p:grpSpPr>
       <p:sp>
         <p:nvSpPr>
-          <p:cNvPr id="2" name="Title 1"/>
+          <p:cNvPr id="25" name="Rectangle 7"/>
           <p:cNvSpPr>
-            <a:spLocks noGrp="1"/>
+            <a:spLocks noChangeArrowheads="1"/>
           </p:cNvSpPr>
-          <p:nvPr>
-            <p:ph type="title"/>
-          </p:nvPr>
+          <p:nvPr/>
         </p:nvSpPr>
-        <p:spPr/>
+        <p:spPr bwMode="auto">
+          <a:xfrm>
+            <a:off x="733738" y="4483780"/>
+            <a:ext cx="4259294" cy="156264"/>
+          </a:xfrm>
+          <a:prstGeom prst="rect">
+            <a:avLst/>
+          </a:prstGeom>
+          <a:solidFill>
+            <a:schemeClr val="accent1"/>
+          </a:solidFill>
+          <a:ln w="9525">
+            <a:miter lim="800000"/>
+            <a:headEnd/>
+            <a:tailEnd/>
+          </a:ln>
+          <a:scene3d>
+            <a:camera prst="legacyPerspectiveTop"/>
+            <a:lightRig rig="legacyFlat3" dir="b"/>
+          </a:scene3d>
+          <a:sp3d extrusionH="887400" prstMaterial="legacyMatte">
+            <a:bevelT w="13500" h="13500" prst="angle"/>
+            <a:bevelB w="13500" h="13500" prst="angle"/>
+            <a:extrusionClr>
+              <a:schemeClr val="accent1"/>
+            </a:extrusionClr>
+          </a:sp3d>
+        </p:spPr>
         <p:txBody>
-          <a:bodyPr/>
+          <a:bodyPr wrap="none" anchor="ctr">
+            <a:flatTx/>
+          </a:bodyPr>
           <a:lstStyle/>
           <a:p>
-            <a:r>
-              <a:rPr lang="en-US" dirty="0"/>
-              <a:t>Question 223.47.1</a:t>
-            </a:r>
+            <a:endParaRPr lang="en-US" sz="2800"/>
           </a:p>
         </p:txBody>
       </p:sp>
       <p:sp>
         <p:nvSpPr>
-          <p:cNvPr id="3" name="Content Placeholder 2"/>
+          <p:cNvPr id="26" name="Rectangle 8"/>
           <p:cNvSpPr>
-            <a:spLocks noGrp="1"/>
+            <a:spLocks noChangeArrowheads="1"/>
           </p:cNvSpPr>
-          <p:nvPr>
-            <p:ph idx="1"/>
-          </p:nvPr>
+          <p:nvPr/>
         </p:nvSpPr>
-        <p:spPr>
+        <p:spPr bwMode="auto">
           <a:xfrm>
-            <a:off x="411480" y="4373880"/>
-            <a:ext cx="7909560" cy="2224723"/>
+            <a:off x="3574067" y="3576892"/>
+            <a:ext cx="4259294" cy="156264"/>
           </a:xfrm>
+          <a:prstGeom prst="rect">
+            <a:avLst/>
+          </a:prstGeom>
+          <a:solidFill>
+            <a:schemeClr val="accent1"/>
+          </a:solidFill>
+          <a:ln w="9525">
+            <a:miter lim="800000"/>
+            <a:headEnd/>
+            <a:tailEnd/>
+          </a:ln>
+          <a:scene3d>
+            <a:camera prst="legacyPerspectiveTop"/>
+            <a:lightRig rig="legacyFlat3" dir="b"/>
+          </a:scene3d>
+          <a:sp3d extrusionH="887400" prstMaterial="legacyMatte">
+            <a:bevelT w="13500" h="13500" prst="angle"/>
+            <a:bevelB w="13500" h="13500" prst="angle"/>
+            <a:extrusionClr>
+              <a:schemeClr val="accent1"/>
+            </a:extrusionClr>
+          </a:sp3d>
         </p:spPr>
         <p:txBody>
-          <a:bodyPr>
-            <a:normAutofit fontScale="77500" lnSpcReduction="20000"/>
+          <a:bodyPr wrap="none" anchor="ctr">
+            <a:flatTx/>
           </a:bodyPr>
           <a:lstStyle/>
           <a:p>
-            <a:pPr>
-              <a:buNone/>
-            </a:pPr>
-            <a:r>
-              <a:rPr lang="en-US" dirty="0"/>
-              <a:t>A magnetic field is stationary with respect to frame  S. The person in frame  S’ has a positive charge. Will the person in frame S see a force acting on the charge?</a:t>
-            </a:r>
-          </a:p>
-          <a:p>
-            <a:pPr marL="514350" indent="-514350">
-              <a:buAutoNum type="alphaLcParenR"/>
-            </a:pPr>
-            <a:r>
-              <a:rPr lang="en-US" dirty="0"/>
-              <a:t>Yes</a:t>
-            </a:r>
-          </a:p>
-          <a:p>
-            <a:pPr marL="514350" indent="-514350">
-              <a:buAutoNum type="alphaLcParenR"/>
-            </a:pPr>
-            <a:r>
-              <a:rPr lang="en-US" dirty="0"/>
-              <a:t>No</a:t>
-            </a:r>
-          </a:p>
-          <a:p>
-            <a:pPr>
-              <a:buNone/>
-            </a:pPr>
-            <a:endParaRPr lang="en-US" dirty="0"/>
+            <a:endParaRPr lang="en-US" sz="2800"/>
           </a:p>
         </p:txBody>
       </p:sp>
       <p:sp>
         <p:nvSpPr>
-          <p:cNvPr id="4" name="Slide Number Placeholder 3"/>
+          <p:cNvPr id="27" name="Line 9"/>
           <p:cNvSpPr>
-            <a:spLocks noGrp="1"/>
+            <a:spLocks noChangeShapeType="1"/>
           </p:cNvSpPr>
-          <p:nvPr>
-            <p:ph type="sldNum" sz="quarter" idx="12"/>
-          </p:nvPr>
+          <p:nvPr/>
         </p:nvSpPr>
-        <p:spPr/>
+        <p:spPr bwMode="auto">
+          <a:xfrm flipV="1">
+            <a:off x="822573" y="2340735"/>
+            <a:ext cx="0" cy="2221176"/>
+          </a:xfrm>
+          <a:prstGeom prst="line">
+            <a:avLst/>
+          </a:prstGeom>
+          <a:noFill/>
+          <a:ln w="9525">
+            <a:solidFill>
+              <a:schemeClr val="tx1"/>
+            </a:solidFill>
+            <a:round/>
+            <a:headEnd/>
+            <a:tailEnd type="triangle" w="med" len="med"/>
+          </a:ln>
+        </p:spPr>
         <p:txBody>
-          <a:bodyPr/>
+          <a:bodyPr wrap="none" anchor="ctr"/>
           <a:lstStyle/>
           <a:p>
-            <a:pPr>
-              <a:defRPr/>
-            </a:pPr>
-            <a:fld id="{64137B81-8888-4253-92EC-0AED2A590749}" type="slidenum">
-              <a:rPr lang="en-US" smtClean="0"/>
-              <a:pPr>
-                <a:defRPr/>
-              </a:pPr>
-              <a:t>2</a:t>
-            </a:fld>
-            <a:endParaRPr lang="en-US"/>
+            <a:endParaRPr lang="en-US" sz="2800"/>
           </a:p>
         </p:txBody>
       </p:sp>
-      <p:pic>
-        <p:nvPicPr>
-          <p:cNvPr id="2506754" name="Picture 2"/>
-          <p:cNvPicPr>
-            <a:picLocks noChangeAspect="1" noChangeArrowheads="1"/>
-          </p:cNvPicPr>
+      <p:sp>
+        <p:nvSpPr>
+          <p:cNvPr id="28" name="Line 10"/>
+          <p:cNvSpPr>
+            <a:spLocks noChangeShapeType="1"/>
+          </p:cNvSpPr>
           <p:nvPr/>
-        </p:nvPicPr>
-        <p:blipFill>
-          <a:blip r:embed="rId2" cstate="print"/>
-          <a:srcRect/>
-          <a:stretch>
-            <a:fillRect/>
-          </a:stretch>
-        </p:blipFill>
+        </p:nvSpPr>
+        <p:spPr bwMode="auto">
+          <a:xfrm flipV="1">
+            <a:off x="832177" y="4573073"/>
+            <a:ext cx="6410549" cy="0"/>
+          </a:xfrm>
+          <a:prstGeom prst="line">
+            <a:avLst/>
+          </a:prstGeom>
+          <a:noFill/>
+          <a:ln w="9525">
+            <a:solidFill>
+              <a:schemeClr val="tx1"/>
+            </a:solidFill>
+            <a:round/>
+            <a:headEnd/>
+            <a:tailEnd type="triangle" w="med" len="med"/>
+          </a:ln>
+        </p:spPr>
+        <p:txBody>
+          <a:bodyPr wrap="none" anchor="ctr"/>
+          <a:lstStyle/>
+          <a:p>
+            <a:endParaRPr lang="en-US" sz="2800"/>
+          </a:p>
+        </p:txBody>
+      </p:sp>
+      <p:sp>
+        <p:nvSpPr>
+          <p:cNvPr id="29" name="Text Box 11"/>
+          <p:cNvSpPr txBox="1">
+            <a:spLocks noChangeArrowheads="1"/>
+          </p:cNvSpPr>
+          <p:nvPr/>
+        </p:nvSpPr>
         <p:spPr bwMode="auto">
           <a:xfrm>
-            <a:off x="1691640" y="1078229"/>
-            <a:ext cx="5440680" cy="3090937"/>
+            <a:off x="381001" y="2062981"/>
+            <a:ext cx="345737" cy="524599"/>
           </a:xfrm>
           <a:prstGeom prst="rect">
             <a:avLst/>
           </a:prstGeom>
           <a:noFill/>
-          <a:ln w="9525">
+          <a:ln w="9525" algn="ctr">
             <a:noFill/>
             <a:miter lim="800000"/>
             <a:headEnd/>
             <a:tailEnd/>
           </a:ln>
-          <a:effectLst/>
         </p:spPr>
-      </p:pic>
+        <p:txBody>
+          <a:bodyPr wrap="none">
+            <a:spAutoFit/>
+          </a:bodyPr>
+          <a:lstStyle/>
+          <a:p>
+            <a:r>
+              <a:rPr lang="en-US" sz="2800" dirty="0"/>
+              <a:t>y</a:t>
+            </a:r>
+          </a:p>
+        </p:txBody>
+      </p:sp>
+      <p:sp>
+        <p:nvSpPr>
+          <p:cNvPr id="30" name="Text Box 12"/>
+          <p:cNvSpPr txBox="1">
+            <a:spLocks noChangeArrowheads="1"/>
+          </p:cNvSpPr>
+          <p:nvPr/>
+        </p:nvSpPr>
+        <p:spPr bwMode="auto">
+          <a:xfrm>
+            <a:off x="7225919" y="4369373"/>
+            <a:ext cx="340936" cy="524599"/>
+          </a:xfrm>
+          <a:prstGeom prst="rect">
+            <a:avLst/>
+          </a:prstGeom>
+          <a:noFill/>
+          <a:ln w="9525" algn="ctr">
+            <a:noFill/>
+            <a:miter lim="800000"/>
+            <a:headEnd/>
+            <a:tailEnd/>
+          </a:ln>
+        </p:spPr>
+        <p:txBody>
+          <a:bodyPr wrap="none">
+            <a:spAutoFit/>
+          </a:bodyPr>
+          <a:lstStyle/>
+          <a:p>
+            <a:r>
+              <a:rPr lang="en-US" sz="2800"/>
+              <a:t>x</a:t>
+            </a:r>
+          </a:p>
+        </p:txBody>
+      </p:sp>
+      <p:sp>
+        <p:nvSpPr>
+          <p:cNvPr id="31" name="Line 13"/>
+          <p:cNvSpPr>
+            <a:spLocks noChangeShapeType="1"/>
+          </p:cNvSpPr>
+          <p:nvPr/>
+        </p:nvSpPr>
+        <p:spPr bwMode="auto">
+          <a:xfrm>
+            <a:off x="5739728" y="2723023"/>
+            <a:ext cx="986792" cy="0"/>
+          </a:xfrm>
+          <a:prstGeom prst="line">
+            <a:avLst/>
+          </a:prstGeom>
+          <a:noFill/>
+          <a:ln w="38100">
+            <a:solidFill>
+              <a:srgbClr val="FF0000"/>
+            </a:solidFill>
+            <a:round/>
+            <a:headEnd/>
+            <a:tailEnd type="triangle" w="med" len="med"/>
+          </a:ln>
+        </p:spPr>
+        <p:txBody>
+          <a:bodyPr wrap="none" anchor="ctr"/>
+          <a:lstStyle/>
+          <a:p>
+            <a:endParaRPr lang="en-US" sz="2800"/>
+          </a:p>
+        </p:txBody>
+      </p:sp>
+      <p:sp>
+        <p:nvSpPr>
+          <p:cNvPr id="32" name="Text Box 14"/>
+          <p:cNvSpPr txBox="1">
+            <a:spLocks noChangeArrowheads="1"/>
+          </p:cNvSpPr>
+          <p:nvPr/>
+        </p:nvSpPr>
+        <p:spPr bwMode="auto">
+          <a:xfrm>
+            <a:off x="6003833" y="1844040"/>
+            <a:ext cx="451380" cy="524599"/>
+          </a:xfrm>
+          <a:prstGeom prst="rect">
+            <a:avLst/>
+          </a:prstGeom>
+          <a:noFill/>
+          <a:ln w="9525" algn="ctr">
+            <a:noFill/>
+            <a:miter lim="800000"/>
+            <a:headEnd/>
+            <a:tailEnd/>
+          </a:ln>
+        </p:spPr>
+        <p:txBody>
+          <a:bodyPr wrap="none">
+            <a:spAutoFit/>
+          </a:bodyPr>
+          <a:lstStyle/>
+          <a:p>
+            <a:r>
+              <a:rPr lang="en-US" sz="2800">
+                <a:solidFill>
+                  <a:srgbClr val="FF0000"/>
+                </a:solidFill>
+              </a:rPr>
+              <a:t>v</a:t>
+            </a:r>
+            <a:r>
+              <a:rPr lang="en-US" sz="2800" baseline="-25000">
+                <a:solidFill>
+                  <a:srgbClr val="FF0000"/>
+                </a:solidFill>
+              </a:rPr>
+              <a:t>x</a:t>
+            </a:r>
+          </a:p>
+        </p:txBody>
+      </p:sp>
+      <p:sp>
+        <p:nvSpPr>
+          <p:cNvPr id="18" name="Oval 16"/>
+          <p:cNvSpPr>
+            <a:spLocks noChangeArrowheads="1"/>
+          </p:cNvSpPr>
+          <p:nvPr/>
+        </p:nvSpPr>
+        <p:spPr bwMode="auto">
+          <a:xfrm flipH="1">
+            <a:off x="7467599" y="2209800"/>
+            <a:ext cx="197686" cy="247204"/>
+          </a:xfrm>
+          <a:prstGeom prst="ellipse">
+            <a:avLst/>
+          </a:prstGeom>
+          <a:solidFill>
+            <a:schemeClr val="tx1"/>
+          </a:solidFill>
+          <a:ln w="9525" algn="ctr">
+            <a:noFill/>
+            <a:round/>
+            <a:headEnd/>
+            <a:tailEnd/>
+          </a:ln>
+        </p:spPr>
+        <p:txBody>
+          <a:bodyPr wrap="none" anchor="ctr"/>
+          <a:lstStyle/>
+          <a:p>
+            <a:endParaRPr lang="en-US" sz="2800"/>
+          </a:p>
+        </p:txBody>
+      </p:sp>
+      <p:sp>
+        <p:nvSpPr>
+          <p:cNvPr id="19" name="Oval 17"/>
+          <p:cNvSpPr>
+            <a:spLocks noChangeArrowheads="1"/>
+          </p:cNvSpPr>
+          <p:nvPr/>
+        </p:nvSpPr>
+        <p:spPr bwMode="auto">
+          <a:xfrm flipH="1">
+            <a:off x="7493348" y="2443520"/>
+            <a:ext cx="166953" cy="533960"/>
+          </a:xfrm>
+          <a:prstGeom prst="ellipse">
+            <a:avLst/>
+          </a:prstGeom>
+          <a:solidFill>
+            <a:schemeClr val="tx1"/>
+          </a:solidFill>
+          <a:ln w="9525" algn="ctr">
+            <a:noFill/>
+            <a:round/>
+            <a:headEnd/>
+            <a:tailEnd/>
+          </a:ln>
+        </p:spPr>
+        <p:txBody>
+          <a:bodyPr wrap="none" anchor="ctr"/>
+          <a:lstStyle/>
+          <a:p>
+            <a:endParaRPr lang="en-US" sz="2800"/>
+          </a:p>
+        </p:txBody>
+      </p:sp>
+      <p:sp>
+        <p:nvSpPr>
+          <p:cNvPr id="20" name="Rectangle 18"/>
+          <p:cNvSpPr>
+            <a:spLocks noChangeArrowheads="1"/>
+          </p:cNvSpPr>
+          <p:nvPr/>
+        </p:nvSpPr>
+        <p:spPr bwMode="auto">
+          <a:xfrm rot="18405958" flipH="1">
+            <a:off x="7663543" y="2439998"/>
+            <a:ext cx="45845" cy="264135"/>
+          </a:xfrm>
+          <a:prstGeom prst="rect">
+            <a:avLst/>
+          </a:prstGeom>
+          <a:solidFill>
+            <a:schemeClr val="tx1"/>
+          </a:solidFill>
+          <a:ln w="9525" algn="ctr">
+            <a:noFill/>
+            <a:miter lim="800000"/>
+            <a:headEnd/>
+            <a:tailEnd/>
+          </a:ln>
+        </p:spPr>
+        <p:txBody>
+          <a:bodyPr wrap="none" anchor="ctr"/>
+          <a:lstStyle/>
+          <a:p>
+            <a:endParaRPr lang="en-US" sz="2800"/>
+          </a:p>
+        </p:txBody>
+      </p:sp>
+      <p:sp>
+        <p:nvSpPr>
+          <p:cNvPr id="21" name="Rectangle 19"/>
+          <p:cNvSpPr>
+            <a:spLocks noChangeArrowheads="1"/>
+          </p:cNvSpPr>
+          <p:nvPr/>
+        </p:nvSpPr>
+        <p:spPr bwMode="auto">
+          <a:xfrm rot="2837193" flipH="1">
+            <a:off x="7658047" y="2602612"/>
+            <a:ext cx="59329" cy="240047"/>
+          </a:xfrm>
+          <a:prstGeom prst="rect">
+            <a:avLst/>
+          </a:prstGeom>
+          <a:solidFill>
+            <a:schemeClr val="tx1"/>
+          </a:solidFill>
+          <a:ln w="9525" algn="ctr">
+            <a:noFill/>
+            <a:miter lim="800000"/>
+            <a:headEnd/>
+            <a:tailEnd/>
+          </a:ln>
+        </p:spPr>
+        <p:txBody>
+          <a:bodyPr wrap="none" anchor="ctr"/>
+          <a:lstStyle/>
+          <a:p>
+            <a:endParaRPr lang="en-US" sz="2800"/>
+          </a:p>
+        </p:txBody>
+      </p:sp>
+      <p:sp>
+        <p:nvSpPr>
+          <p:cNvPr id="22" name="Rectangle 20"/>
+          <p:cNvSpPr>
+            <a:spLocks noChangeArrowheads="1"/>
+          </p:cNvSpPr>
+          <p:nvPr/>
+        </p:nvSpPr>
+        <p:spPr bwMode="auto">
+          <a:xfrm rot="725482" flipH="1">
+            <a:off x="7520758" y="2895678"/>
+            <a:ext cx="78078" cy="304735"/>
+          </a:xfrm>
+          <a:prstGeom prst="rect">
+            <a:avLst/>
+          </a:prstGeom>
+          <a:solidFill>
+            <a:schemeClr val="tx1"/>
+          </a:solidFill>
+          <a:ln w="9525" algn="ctr">
+            <a:noFill/>
+            <a:miter lim="800000"/>
+            <a:headEnd/>
+            <a:tailEnd/>
+          </a:ln>
+        </p:spPr>
+        <p:txBody>
+          <a:bodyPr wrap="none" anchor="ctr"/>
+          <a:lstStyle/>
+          <a:p>
+            <a:endParaRPr lang="en-US" sz="2800"/>
+          </a:p>
+        </p:txBody>
+      </p:sp>
+      <p:sp>
+        <p:nvSpPr>
+          <p:cNvPr id="23" name="Rectangle 21"/>
+          <p:cNvSpPr>
+            <a:spLocks noChangeArrowheads="1"/>
+          </p:cNvSpPr>
+          <p:nvPr/>
+        </p:nvSpPr>
+        <p:spPr bwMode="auto">
+          <a:xfrm rot="20498368" flipH="1">
+            <a:off x="7528234" y="3157264"/>
+            <a:ext cx="78078" cy="304735"/>
+          </a:xfrm>
+          <a:prstGeom prst="rect">
+            <a:avLst/>
+          </a:prstGeom>
+          <a:solidFill>
+            <a:schemeClr val="tx1"/>
+          </a:solidFill>
+          <a:ln w="9525" algn="ctr">
+            <a:noFill/>
+            <a:miter lim="800000"/>
+            <a:headEnd/>
+            <a:tailEnd/>
+          </a:ln>
+        </p:spPr>
+        <p:txBody>
+          <a:bodyPr wrap="none" anchor="ctr"/>
+          <a:lstStyle/>
+          <a:p>
+            <a:endParaRPr lang="en-US" sz="2800"/>
+          </a:p>
+        </p:txBody>
+      </p:sp>
+      <p:sp>
+        <p:nvSpPr>
+          <p:cNvPr id="24" name="Rectangle 22"/>
+          <p:cNvSpPr>
+            <a:spLocks noChangeArrowheads="1"/>
+          </p:cNvSpPr>
+          <p:nvPr/>
+        </p:nvSpPr>
+        <p:spPr bwMode="auto">
+          <a:xfrm flipH="1">
+            <a:off x="7486703" y="3422447"/>
+            <a:ext cx="161970" cy="64722"/>
+          </a:xfrm>
+          <a:prstGeom prst="rect">
+            <a:avLst/>
+          </a:prstGeom>
+          <a:solidFill>
+            <a:schemeClr val="tx1"/>
+          </a:solidFill>
+          <a:ln w="9525" algn="ctr">
+            <a:noFill/>
+            <a:miter lim="800000"/>
+            <a:headEnd/>
+            <a:tailEnd/>
+          </a:ln>
+        </p:spPr>
+        <p:txBody>
+          <a:bodyPr wrap="none" anchor="ctr"/>
+          <a:lstStyle/>
+          <a:p>
+            <a:endParaRPr lang="en-US" sz="2800"/>
+          </a:p>
+        </p:txBody>
+      </p:sp>
+      <p:grpSp>
+        <p:nvGrpSpPr>
+          <p:cNvPr id="2" name="Group 23"/>
+          <p:cNvGrpSpPr>
+            <a:grpSpLocks/>
+          </p:cNvGrpSpPr>
+          <p:nvPr/>
+        </p:nvGrpSpPr>
+        <p:grpSpPr bwMode="auto">
+          <a:xfrm>
+            <a:off x="1249680" y="3017520"/>
+            <a:ext cx="396240" cy="1363014"/>
+            <a:chOff x="4491" y="2017"/>
+            <a:chExt cx="422" cy="1421"/>
+          </a:xfrm>
+        </p:grpSpPr>
+        <p:sp>
+          <p:nvSpPr>
+            <p:cNvPr id="11" name="Oval 24"/>
+            <p:cNvSpPr>
+              <a:spLocks noChangeArrowheads="1"/>
+            </p:cNvSpPr>
+            <p:nvPr/>
+          </p:nvSpPr>
+          <p:spPr bwMode="auto">
+            <a:xfrm>
+              <a:off x="4675" y="2017"/>
+              <a:ext cx="238" cy="275"/>
+            </a:xfrm>
+            <a:prstGeom prst="ellipse">
+              <a:avLst/>
+            </a:prstGeom>
+            <a:solidFill>
+              <a:schemeClr val="tx1"/>
+            </a:solidFill>
+            <a:ln w="9525" algn="ctr">
+              <a:noFill/>
+              <a:round/>
+              <a:headEnd/>
+              <a:tailEnd/>
+            </a:ln>
+          </p:spPr>
+          <p:txBody>
+            <a:bodyPr wrap="none" anchor="ctr"/>
+            <a:lstStyle/>
+            <a:p>
+              <a:endParaRPr lang="en-US" sz="2800"/>
+            </a:p>
+          </p:txBody>
+        </p:sp>
+        <p:sp>
+          <p:nvSpPr>
+            <p:cNvPr id="12" name="Oval 25"/>
+            <p:cNvSpPr>
+              <a:spLocks noChangeArrowheads="1"/>
+            </p:cNvSpPr>
+            <p:nvPr/>
+          </p:nvSpPr>
+          <p:spPr bwMode="auto">
+            <a:xfrm>
+              <a:off x="4681" y="2277"/>
+              <a:ext cx="201" cy="594"/>
+            </a:xfrm>
+            <a:prstGeom prst="ellipse">
+              <a:avLst/>
+            </a:prstGeom>
+            <a:solidFill>
+              <a:schemeClr val="tx1"/>
+            </a:solidFill>
+            <a:ln w="9525" algn="ctr">
+              <a:noFill/>
+              <a:round/>
+              <a:headEnd/>
+              <a:tailEnd/>
+            </a:ln>
+          </p:spPr>
+          <p:txBody>
+            <a:bodyPr wrap="none" anchor="ctr"/>
+            <a:lstStyle/>
+            <a:p>
+              <a:endParaRPr lang="en-US" sz="2800"/>
+            </a:p>
+          </p:txBody>
+        </p:sp>
+        <p:sp>
+          <p:nvSpPr>
+            <p:cNvPr id="13" name="Rectangle 26"/>
+            <p:cNvSpPr>
+              <a:spLocks noChangeArrowheads="1"/>
+            </p:cNvSpPr>
+            <p:nvPr/>
+          </p:nvSpPr>
+          <p:spPr bwMode="auto">
+            <a:xfrm rot="3194042">
+              <a:off x="4624" y="2261"/>
+              <a:ext cx="51" cy="318"/>
+            </a:xfrm>
+            <a:prstGeom prst="rect">
+              <a:avLst/>
+            </a:prstGeom>
+            <a:solidFill>
+              <a:schemeClr val="tx1"/>
+            </a:solidFill>
+            <a:ln w="9525" algn="ctr">
+              <a:noFill/>
+              <a:miter lim="800000"/>
+              <a:headEnd/>
+              <a:tailEnd/>
+            </a:ln>
+          </p:spPr>
+          <p:txBody>
+            <a:bodyPr wrap="none" anchor="ctr"/>
+            <a:lstStyle/>
+            <a:p>
+              <a:endParaRPr lang="en-US" sz="2800"/>
+            </a:p>
+          </p:txBody>
+        </p:sp>
+        <p:sp>
+          <p:nvSpPr>
+            <p:cNvPr id="14" name="Rectangle 27"/>
+            <p:cNvSpPr>
+              <a:spLocks noChangeArrowheads="1"/>
+            </p:cNvSpPr>
+            <p:nvPr/>
+          </p:nvSpPr>
+          <p:spPr bwMode="auto">
+            <a:xfrm rot="-2837193">
+              <a:off x="4615" y="2443"/>
+              <a:ext cx="66" cy="289"/>
+            </a:xfrm>
+            <a:prstGeom prst="rect">
+              <a:avLst/>
+            </a:prstGeom>
+            <a:solidFill>
+              <a:schemeClr val="tx1"/>
+            </a:solidFill>
+            <a:ln w="9525" algn="ctr">
+              <a:noFill/>
+              <a:miter lim="800000"/>
+              <a:headEnd/>
+              <a:tailEnd/>
+            </a:ln>
+          </p:spPr>
+          <p:txBody>
+            <a:bodyPr wrap="none" anchor="ctr"/>
+            <a:lstStyle/>
+            <a:p>
+              <a:endParaRPr lang="en-US" sz="2800"/>
+            </a:p>
+          </p:txBody>
+        </p:sp>
+        <p:sp>
+          <p:nvSpPr>
+            <p:cNvPr id="15" name="Rectangle 28"/>
+            <p:cNvSpPr>
+              <a:spLocks noChangeArrowheads="1"/>
+            </p:cNvSpPr>
+            <p:nvPr/>
+          </p:nvSpPr>
+          <p:spPr bwMode="auto">
+            <a:xfrm rot="-725482">
+              <a:off x="4755" y="2780"/>
+              <a:ext cx="94" cy="339"/>
+            </a:xfrm>
+            <a:prstGeom prst="rect">
+              <a:avLst/>
+            </a:prstGeom>
+            <a:solidFill>
+              <a:schemeClr val="tx1"/>
+            </a:solidFill>
+            <a:ln w="9525" algn="ctr">
+              <a:noFill/>
+              <a:miter lim="800000"/>
+              <a:headEnd/>
+              <a:tailEnd/>
+            </a:ln>
+          </p:spPr>
+          <p:txBody>
+            <a:bodyPr wrap="none" anchor="ctr"/>
+            <a:lstStyle/>
+            <a:p>
+              <a:endParaRPr lang="en-US" sz="2800"/>
+            </a:p>
+          </p:txBody>
+        </p:sp>
+        <p:sp>
+          <p:nvSpPr>
+            <p:cNvPr id="16" name="Rectangle 29"/>
+            <p:cNvSpPr>
+              <a:spLocks noChangeArrowheads="1"/>
+            </p:cNvSpPr>
+            <p:nvPr/>
+          </p:nvSpPr>
+          <p:spPr bwMode="auto">
+            <a:xfrm rot="1101632">
+              <a:off x="4746" y="3071"/>
+              <a:ext cx="94" cy="339"/>
+            </a:xfrm>
+            <a:prstGeom prst="rect">
+              <a:avLst/>
+            </a:prstGeom>
+            <a:solidFill>
+              <a:schemeClr val="tx1"/>
+            </a:solidFill>
+            <a:ln w="9525" algn="ctr">
+              <a:noFill/>
+              <a:miter lim="800000"/>
+              <a:headEnd/>
+              <a:tailEnd/>
+            </a:ln>
+          </p:spPr>
+          <p:txBody>
+            <a:bodyPr wrap="none" anchor="ctr"/>
+            <a:lstStyle/>
+            <a:p>
+              <a:endParaRPr lang="en-US" sz="2800"/>
+            </a:p>
+          </p:txBody>
+        </p:sp>
+        <p:sp>
+          <p:nvSpPr>
+            <p:cNvPr id="17" name="Rectangle 30"/>
+            <p:cNvSpPr>
+              <a:spLocks noChangeArrowheads="1"/>
+            </p:cNvSpPr>
+            <p:nvPr/>
+          </p:nvSpPr>
+          <p:spPr bwMode="auto">
+            <a:xfrm>
+              <a:off x="4695" y="3366"/>
+              <a:ext cx="195" cy="72"/>
+            </a:xfrm>
+            <a:prstGeom prst="rect">
+              <a:avLst/>
+            </a:prstGeom>
+            <a:solidFill>
+              <a:schemeClr val="tx1"/>
+            </a:solidFill>
+            <a:ln w="9525" algn="ctr">
+              <a:noFill/>
+              <a:miter lim="800000"/>
+              <a:headEnd/>
+              <a:tailEnd/>
+            </a:ln>
+          </p:spPr>
+          <p:txBody>
+            <a:bodyPr wrap="none" anchor="ctr"/>
+            <a:lstStyle/>
+            <a:p>
+              <a:endParaRPr lang="en-US" sz="2800"/>
+            </a:p>
+          </p:txBody>
+        </p:sp>
+      </p:grpSp>
+      <p:sp>
+        <p:nvSpPr>
+          <p:cNvPr id="6" name="Text Box 31"/>
+          <p:cNvSpPr txBox="1">
+            <a:spLocks noChangeArrowheads="1"/>
+          </p:cNvSpPr>
+          <p:nvPr/>
+        </p:nvSpPr>
+        <p:spPr bwMode="auto">
+          <a:xfrm>
+            <a:off x="2314323" y="4653566"/>
+            <a:ext cx="350539" cy="524599"/>
+          </a:xfrm>
+          <a:prstGeom prst="rect">
+            <a:avLst/>
+          </a:prstGeom>
+          <a:noFill/>
+          <a:ln w="9525" algn="ctr">
+            <a:noFill/>
+            <a:miter lim="800000"/>
+            <a:headEnd/>
+            <a:tailEnd/>
+          </a:ln>
+        </p:spPr>
+        <p:txBody>
+          <a:bodyPr wrap="none">
+            <a:spAutoFit/>
+          </a:bodyPr>
+          <a:lstStyle/>
+          <a:p>
+            <a:r>
+              <a:rPr lang="en-US" sz="2800" dirty="0"/>
+              <a:t>S</a:t>
+            </a:r>
+          </a:p>
+        </p:txBody>
+      </p:sp>
+      <p:sp>
+        <p:nvSpPr>
+          <p:cNvPr id="7" name="Text Box 32"/>
+          <p:cNvSpPr txBox="1">
+            <a:spLocks noChangeArrowheads="1"/>
+          </p:cNvSpPr>
+          <p:nvPr/>
+        </p:nvSpPr>
+        <p:spPr bwMode="auto">
+          <a:xfrm>
+            <a:off x="5436500" y="3719633"/>
+            <a:ext cx="436974" cy="524599"/>
+          </a:xfrm>
+          <a:prstGeom prst="rect">
+            <a:avLst/>
+          </a:prstGeom>
+          <a:noFill/>
+          <a:ln w="9525" algn="ctr">
+            <a:noFill/>
+            <a:miter lim="800000"/>
+            <a:headEnd/>
+            <a:tailEnd/>
+          </a:ln>
+        </p:spPr>
+        <p:txBody>
+          <a:bodyPr wrap="none">
+            <a:spAutoFit/>
+          </a:bodyPr>
+          <a:lstStyle/>
+          <a:p>
+            <a:r>
+              <a:rPr lang="en-US" sz="2800" dirty="0"/>
+              <a:t>S’</a:t>
+            </a:r>
+          </a:p>
+        </p:txBody>
+      </p:sp>
+      <p:sp>
+        <p:nvSpPr>
+          <p:cNvPr id="33" name="Line 9"/>
+          <p:cNvSpPr>
+            <a:spLocks noChangeShapeType="1"/>
+          </p:cNvSpPr>
+          <p:nvPr/>
+        </p:nvSpPr>
+        <p:spPr bwMode="auto">
+          <a:xfrm flipV="1">
+            <a:off x="3596253" y="1411095"/>
+            <a:ext cx="0" cy="2221176"/>
+          </a:xfrm>
+          <a:prstGeom prst="line">
+            <a:avLst/>
+          </a:prstGeom>
+          <a:noFill/>
+          <a:ln w="9525">
+            <a:solidFill>
+              <a:schemeClr val="tx1"/>
+            </a:solidFill>
+            <a:round/>
+            <a:headEnd/>
+            <a:tailEnd type="triangle" w="med" len="med"/>
+          </a:ln>
+        </p:spPr>
+        <p:txBody>
+          <a:bodyPr wrap="none" anchor="ctr"/>
+          <a:lstStyle/>
+          <a:p>
+            <a:endParaRPr lang="en-US" sz="2800"/>
+          </a:p>
+        </p:txBody>
+      </p:sp>
+      <p:sp>
+        <p:nvSpPr>
+          <p:cNvPr id="34" name="Line 10"/>
+          <p:cNvSpPr>
+            <a:spLocks noChangeShapeType="1"/>
+          </p:cNvSpPr>
+          <p:nvPr/>
+        </p:nvSpPr>
+        <p:spPr bwMode="auto">
+          <a:xfrm flipV="1">
+            <a:off x="3605857" y="3642360"/>
+            <a:ext cx="5050463" cy="1073"/>
+          </a:xfrm>
+          <a:prstGeom prst="line">
+            <a:avLst/>
+          </a:prstGeom>
+          <a:noFill/>
+          <a:ln w="9525">
+            <a:solidFill>
+              <a:schemeClr val="tx1"/>
+            </a:solidFill>
+            <a:round/>
+            <a:headEnd/>
+            <a:tailEnd type="triangle" w="med" len="med"/>
+          </a:ln>
+        </p:spPr>
+        <p:txBody>
+          <a:bodyPr wrap="none" anchor="ctr"/>
+          <a:lstStyle/>
+          <a:p>
+            <a:endParaRPr lang="en-US" sz="2800"/>
+          </a:p>
+        </p:txBody>
+      </p:sp>
+      <p:sp>
+        <p:nvSpPr>
+          <p:cNvPr id="35" name="Text Box 11"/>
+          <p:cNvSpPr txBox="1">
+            <a:spLocks noChangeArrowheads="1"/>
+          </p:cNvSpPr>
+          <p:nvPr/>
+        </p:nvSpPr>
+        <p:spPr bwMode="auto">
+          <a:xfrm>
+            <a:off x="3154681" y="1133341"/>
+            <a:ext cx="453714" cy="523220"/>
+          </a:xfrm>
+          <a:prstGeom prst="rect">
+            <a:avLst/>
+          </a:prstGeom>
+          <a:noFill/>
+          <a:ln w="9525" algn="ctr">
+            <a:noFill/>
+            <a:miter lim="800000"/>
+            <a:headEnd/>
+            <a:tailEnd/>
+          </a:ln>
+        </p:spPr>
+        <p:txBody>
+          <a:bodyPr wrap="none">
+            <a:spAutoFit/>
+          </a:bodyPr>
+          <a:lstStyle/>
+          <a:p>
+            <a:r>
+              <a:rPr lang="en-US" sz="2800" dirty="0"/>
+              <a:t>y’</a:t>
+            </a:r>
+          </a:p>
+        </p:txBody>
+      </p:sp>
+      <p:sp>
+        <p:nvSpPr>
+          <p:cNvPr id="36" name="Text Box 12"/>
+          <p:cNvSpPr txBox="1">
+            <a:spLocks noChangeArrowheads="1"/>
+          </p:cNvSpPr>
+          <p:nvPr/>
+        </p:nvSpPr>
+        <p:spPr bwMode="auto">
+          <a:xfrm>
+            <a:off x="8094599" y="3668333"/>
+            <a:ext cx="438838" cy="523220"/>
+          </a:xfrm>
+          <a:prstGeom prst="rect">
+            <a:avLst/>
+          </a:prstGeom>
+          <a:noFill/>
+          <a:ln w="9525" algn="ctr">
+            <a:noFill/>
+            <a:miter lim="800000"/>
+            <a:headEnd/>
+            <a:tailEnd/>
+          </a:ln>
+        </p:spPr>
+        <p:txBody>
+          <a:bodyPr wrap="none">
+            <a:spAutoFit/>
+          </a:bodyPr>
+          <a:lstStyle/>
+          <a:p>
+            <a:r>
+              <a:rPr lang="en-US" sz="2800" dirty="0"/>
+              <a:t>x’</a:t>
+            </a:r>
+          </a:p>
+        </p:txBody>
+      </p:sp>
     </p:spTree>
   </p:cSld>
   <p:clrMapOvr>
@@ -33380,7 +34273,7 @@
           <a:p>
             <a:r>
               <a:rPr lang="en-US" dirty="0"/>
-              <a:t>Question 223.47.1.5</a:t>
+              <a:t>Question 223.47.1</a:t>
             </a:r>
           </a:p>
         </p:txBody>
@@ -33397,13 +34290,13 @@
         </p:nvSpPr>
         <p:spPr>
           <a:xfrm>
-            <a:off x="411480" y="3509682"/>
-            <a:ext cx="7909560" cy="3088921"/>
+            <a:off x="411480" y="4373880"/>
+            <a:ext cx="7909560" cy="2224723"/>
           </a:xfrm>
         </p:spPr>
         <p:txBody>
           <a:bodyPr>
-            <a:normAutofit fontScale="92500" lnSpcReduction="10000"/>
+            <a:normAutofit fontScale="77500" lnSpcReduction="20000"/>
           </a:bodyPr>
           <a:lstStyle/>
           <a:p>
@@ -33412,7 +34305,7 @@
             </a:pPr>
             <a:r>
               <a:rPr lang="en-US" dirty="0"/>
-              <a:t>What is the magnitude of the force on the charge according to the person in frame S?</a:t>
+              <a:t>A magnetic field is stationary with respect to frame  S. The person in frame  S’ has a positive charge. Will the person in frame S see a force acting on the charge?</a:t>
             </a:r>
           </a:p>
           <a:p>
@@ -33421,7 +34314,7 @@
             </a:pPr>
             <a:r>
               <a:rPr lang="en-US" dirty="0"/>
-              <a:t>F=mg</a:t>
+              <a:t>Yes</a:t>
             </a:r>
           </a:p>
           <a:p>
@@ -33430,49 +34323,7 @@
             </a:pPr>
             <a:r>
               <a:rPr lang="en-US" dirty="0"/>
-              <a:t>F=</a:t>
-            </a:r>
-            <a:r>
-              <a:rPr lang="en-US" dirty="0" err="1"/>
-              <a:t>qvBsin</a:t>
-            </a:r>
-            <a:r>
-              <a:rPr lang="en-US" dirty="0">
-                <a:sym typeface="Symbol"/>
-              </a:rPr>
-              <a:t></a:t>
-            </a:r>
-            <a:endParaRPr lang="en-US" dirty="0"/>
-          </a:p>
-          <a:p>
-            <a:pPr marL="514350" indent="-514350">
-              <a:buAutoNum type="alphaLcParenR"/>
-            </a:pPr>
-            <a:r>
-              <a:rPr lang="en-US" dirty="0"/>
-              <a:t>F=</a:t>
-            </a:r>
-            <a:r>
-              <a:rPr lang="en-US" dirty="0" err="1"/>
-              <a:t>qE</a:t>
-            </a:r>
-            <a:endParaRPr lang="en-US" dirty="0"/>
-          </a:p>
-          <a:p>
-            <a:pPr marL="514350" indent="-514350">
-              <a:buAutoNum type="alphaLcParenR"/>
-            </a:pPr>
-            <a:r>
-              <a:rPr lang="en-US" dirty="0"/>
-              <a:t>F=</a:t>
-            </a:r>
-            <a:r>
-              <a:rPr lang="en-US" dirty="0" err="1"/>
-              <a:t>arcsin</a:t>
-            </a:r>
-            <a:r>
-              <a:rPr lang="en-US" dirty="0"/>
-              <a:t>(-1)</a:t>
+              <a:t>No</a:t>
             </a:r>
           </a:p>
           <a:p>
@@ -33529,8 +34380,8 @@
         </p:blipFill>
         <p:spPr bwMode="auto">
           <a:xfrm>
-            <a:off x="2874982" y="1158912"/>
-            <a:ext cx="3660289" cy="2079469"/>
+            <a:off x="1691640" y="1078229"/>
+            <a:ext cx="5440680" cy="3090937"/>
           </a:xfrm>
           <a:prstGeom prst="rect">
             <a:avLst/>
@@ -33587,7 +34438,7 @@
           <a:p>
             <a:r>
               <a:rPr lang="en-US" dirty="0"/>
-              <a:t>Question 223.47.1.6</a:t>
+              <a:t>Question 223.47.1.5</a:t>
             </a:r>
           </a:p>
         </p:txBody>
@@ -33619,7 +34470,7 @@
             </a:pPr>
             <a:r>
               <a:rPr lang="en-US" dirty="0"/>
-              <a:t>What is the direction of the force on the charge according to the person in frame S?</a:t>
+              <a:t>What is the magnitude of the force on the charge according to the person in frame S?</a:t>
             </a:r>
           </a:p>
           <a:p>
@@ -33628,7 +34479,7 @@
             </a:pPr>
             <a:r>
               <a:rPr lang="en-US" dirty="0"/>
-              <a:t>Up</a:t>
+              <a:t>F=mg</a:t>
             </a:r>
           </a:p>
           <a:p>
@@ -33637,8 +34488,19 @@
             </a:pPr>
             <a:r>
               <a:rPr lang="en-US" dirty="0"/>
-              <a:t>Down</a:t>
+              <a:t>F=</a:t>
             </a:r>
+            <a:r>
+              <a:rPr lang="en-US" dirty="0" err="1"/>
+              <a:t>qvBsin</a:t>
+            </a:r>
+            <a:r>
+              <a:rPr lang="en-US" dirty="0">
+                <a:sym typeface="Symbol"/>
+              </a:rPr>
+              <a:t></a:t>
+            </a:r>
+            <a:endParaRPr lang="en-US" dirty="0"/>
           </a:p>
           <a:p>
             <a:pPr marL="514350" indent="-514350">
@@ -33646,8 +34508,13 @@
             </a:pPr>
             <a:r>
               <a:rPr lang="en-US" dirty="0"/>
-              <a:t>Into the page</a:t>
+              <a:t>F=</a:t>
             </a:r>
+            <a:r>
+              <a:rPr lang="en-US" dirty="0" err="1"/>
+              <a:t>qE</a:t>
+            </a:r>
+            <a:endParaRPr lang="en-US" dirty="0"/>
           </a:p>
           <a:p>
             <a:pPr marL="514350" indent="-514350">
@@ -33655,7 +34522,15 @@
             </a:pPr>
             <a:r>
               <a:rPr lang="en-US" dirty="0"/>
-              <a:t>Out of the page</a:t>
+              <a:t>F=</a:t>
+            </a:r>
+            <a:r>
+              <a:rPr lang="en-US" dirty="0" err="1"/>
+              <a:t>arcsin</a:t>
+            </a:r>
+            <a:r>
+              <a:rPr lang="en-US" dirty="0"/>
+              <a:t>(-1)</a:t>
             </a:r>
           </a:p>
           <a:p>
@@ -33690,6 +34565,189 @@
                 <a:defRPr/>
               </a:pPr>
               <a:t>4</a:t>
+            </a:fld>
+            <a:endParaRPr lang="en-US"/>
+          </a:p>
+        </p:txBody>
+      </p:sp>
+      <p:pic>
+        <p:nvPicPr>
+          <p:cNvPr id="2506754" name="Picture 2"/>
+          <p:cNvPicPr>
+            <a:picLocks noChangeAspect="1" noChangeArrowheads="1"/>
+          </p:cNvPicPr>
+          <p:nvPr/>
+        </p:nvPicPr>
+        <p:blipFill>
+          <a:blip r:embed="rId2" cstate="print"/>
+          <a:srcRect/>
+          <a:stretch>
+            <a:fillRect/>
+          </a:stretch>
+        </p:blipFill>
+        <p:spPr bwMode="auto">
+          <a:xfrm>
+            <a:off x="2874982" y="1158912"/>
+            <a:ext cx="3660289" cy="2079469"/>
+          </a:xfrm>
+          <a:prstGeom prst="rect">
+            <a:avLst/>
+          </a:prstGeom>
+          <a:noFill/>
+          <a:ln w="9525">
+            <a:noFill/>
+            <a:miter lim="800000"/>
+            <a:headEnd/>
+            <a:tailEnd/>
+          </a:ln>
+          <a:effectLst/>
+        </p:spPr>
+      </p:pic>
+    </p:spTree>
+  </p:cSld>
+  <p:clrMapOvr>
+    <a:masterClrMapping/>
+  </p:clrMapOvr>
+</p:sld>
+</file>
+
+<file path=ppt/slides/slide5.xml><?xml version="1.0" encoding="utf-8"?>
+<p:sld xmlns:a="http://schemas.openxmlformats.org/drawingml/2006/main" xmlns:r="http://schemas.openxmlformats.org/officeDocument/2006/relationships" xmlns:p="http://schemas.openxmlformats.org/presentationml/2006/main">
+  <p:cSld>
+    <p:spTree>
+      <p:nvGrpSpPr>
+        <p:cNvPr id="1" name=""/>
+        <p:cNvGrpSpPr/>
+        <p:nvPr/>
+      </p:nvGrpSpPr>
+      <p:grpSpPr>
+        <a:xfrm>
+          <a:off x="0" y="0"/>
+          <a:ext cx="0" cy="0"/>
+          <a:chOff x="0" y="0"/>
+          <a:chExt cx="0" cy="0"/>
+        </a:xfrm>
+      </p:grpSpPr>
+      <p:sp>
+        <p:nvSpPr>
+          <p:cNvPr id="2" name="Title 1"/>
+          <p:cNvSpPr>
+            <a:spLocks noGrp="1"/>
+          </p:cNvSpPr>
+          <p:nvPr>
+            <p:ph type="title"/>
+          </p:nvPr>
+        </p:nvSpPr>
+        <p:spPr/>
+        <p:txBody>
+          <a:bodyPr/>
+          <a:lstStyle/>
+          <a:p>
+            <a:r>
+              <a:rPr lang="en-US" dirty="0"/>
+              <a:t>Question 223.47.1.6</a:t>
+            </a:r>
+          </a:p>
+        </p:txBody>
+      </p:sp>
+      <p:sp>
+        <p:nvSpPr>
+          <p:cNvPr id="3" name="Content Placeholder 2"/>
+          <p:cNvSpPr>
+            <a:spLocks noGrp="1"/>
+          </p:cNvSpPr>
+          <p:nvPr>
+            <p:ph idx="1"/>
+          </p:nvPr>
+        </p:nvSpPr>
+        <p:spPr>
+          <a:xfrm>
+            <a:off x="411480" y="3509682"/>
+            <a:ext cx="7909560" cy="3088921"/>
+          </a:xfrm>
+        </p:spPr>
+        <p:txBody>
+          <a:bodyPr>
+            <a:normAutofit fontScale="92500" lnSpcReduction="10000"/>
+          </a:bodyPr>
+          <a:lstStyle/>
+          <a:p>
+            <a:pPr>
+              <a:buNone/>
+            </a:pPr>
+            <a:r>
+              <a:rPr lang="en-US" dirty="0"/>
+              <a:t>What is the direction of the force on the charge according to the person in frame S?</a:t>
+            </a:r>
+          </a:p>
+          <a:p>
+            <a:pPr marL="514350" indent="-514350">
+              <a:buAutoNum type="alphaLcParenR"/>
+            </a:pPr>
+            <a:r>
+              <a:rPr lang="en-US" dirty="0"/>
+              <a:t>Up</a:t>
+            </a:r>
+          </a:p>
+          <a:p>
+            <a:pPr marL="514350" indent="-514350">
+              <a:buAutoNum type="alphaLcParenR"/>
+            </a:pPr>
+            <a:r>
+              <a:rPr lang="en-US" dirty="0"/>
+              <a:t>Down</a:t>
+            </a:r>
+          </a:p>
+          <a:p>
+            <a:pPr marL="514350" indent="-514350">
+              <a:buAutoNum type="alphaLcParenR"/>
+            </a:pPr>
+            <a:r>
+              <a:rPr lang="en-US" dirty="0"/>
+              <a:t>Into the page</a:t>
+            </a:r>
+          </a:p>
+          <a:p>
+            <a:pPr marL="514350" indent="-514350">
+              <a:buAutoNum type="alphaLcParenR"/>
+            </a:pPr>
+            <a:r>
+              <a:rPr lang="en-US" dirty="0"/>
+              <a:t>Out of the page</a:t>
+            </a:r>
+          </a:p>
+          <a:p>
+            <a:pPr>
+              <a:buNone/>
+            </a:pPr>
+            <a:endParaRPr lang="en-US" dirty="0"/>
+          </a:p>
+        </p:txBody>
+      </p:sp>
+      <p:sp>
+        <p:nvSpPr>
+          <p:cNvPr id="4" name="Slide Number Placeholder 3"/>
+          <p:cNvSpPr>
+            <a:spLocks noGrp="1"/>
+          </p:cNvSpPr>
+          <p:nvPr>
+            <p:ph type="sldNum" sz="quarter" idx="12"/>
+          </p:nvPr>
+        </p:nvSpPr>
+        <p:spPr/>
+        <p:txBody>
+          <a:bodyPr/>
+          <a:lstStyle/>
+          <a:p>
+            <a:pPr>
+              <a:defRPr/>
+            </a:pPr>
+            <a:fld id="{64137B81-8888-4253-92EC-0AED2A590749}" type="slidenum">
+              <a:rPr lang="en-US" smtClean="0"/>
+              <a:pPr>
+                <a:defRPr/>
+              </a:pPr>
+              <a:t>5</a:t>
             </a:fld>
             <a:endParaRPr lang="en-US"/>
           </a:p>
@@ -33741,7 +34799,7 @@
 </p:sld>
 </file>
 
-<file path=ppt/slides/slide5.xml><?xml version="1.0" encoding="utf-8"?>
+<file path=ppt/slides/slide6.xml><?xml version="1.0" encoding="utf-8"?>
 <p:sld xmlns:a="http://schemas.openxmlformats.org/drawingml/2006/main" xmlns:r="http://schemas.openxmlformats.org/officeDocument/2006/relationships" xmlns:p="http://schemas.openxmlformats.org/presentationml/2006/main">
   <p:cSld>
     <p:spTree>
@@ -33859,7 +34917,7 @@
               <a:pPr>
                 <a:defRPr/>
               </a:pPr>
-              <a:t>5</a:t>
+              <a:t>6</a:t>
             </a:fld>
             <a:endParaRPr lang="en-US"/>
           </a:p>
@@ -33906,7 +34964,7 @@
 </p:sld>
 </file>
 
-<file path=ppt/slides/slide6.xml><?xml version="1.0" encoding="utf-8"?>
+<file path=ppt/slides/slide7.xml><?xml version="1.0" encoding="utf-8"?>
 <p:sld xmlns:a="http://schemas.openxmlformats.org/drawingml/2006/main" xmlns:r="http://schemas.openxmlformats.org/officeDocument/2006/relationships" xmlns:p="http://schemas.openxmlformats.org/presentationml/2006/main">
   <p:cSld>
     <p:spTree>
@@ -34042,7 +35100,7 @@
               <a:pPr>
                 <a:defRPr/>
               </a:pPr>
-              <a:t>6</a:t>
+              <a:t>7</a:t>
             </a:fld>
             <a:endParaRPr lang="en-US"/>
           </a:p>
@@ -34081,1057 +35139,6 @@
           <a:effectLst/>
         </p:spPr>
       </p:pic>
-    </p:spTree>
-  </p:cSld>
-  <p:clrMapOvr>
-    <a:masterClrMapping/>
-  </p:clrMapOvr>
-</p:sld>
-</file>
-
-<file path=ppt/slides/slide7.xml><?xml version="1.0" encoding="utf-8"?>
-<p:sld xmlns:a="http://schemas.openxmlformats.org/drawingml/2006/main" xmlns:r="http://schemas.openxmlformats.org/officeDocument/2006/relationships" xmlns:p="http://schemas.openxmlformats.org/presentationml/2006/main">
-  <p:cSld>
-    <p:spTree>
-      <p:nvGrpSpPr>
-        <p:cNvPr id="1" name=""/>
-        <p:cNvGrpSpPr/>
-        <p:nvPr/>
-      </p:nvGrpSpPr>
-      <p:grpSpPr>
-        <a:xfrm>
-          <a:off x="0" y="0"/>
-          <a:ext cx="0" cy="0"/>
-          <a:chOff x="0" y="0"/>
-          <a:chExt cx="0" cy="0"/>
-        </a:xfrm>
-      </p:grpSpPr>
-      <p:sp>
-        <p:nvSpPr>
-          <p:cNvPr id="25" name="Rectangle 7"/>
-          <p:cNvSpPr>
-            <a:spLocks noChangeArrowheads="1"/>
-          </p:cNvSpPr>
-          <p:nvPr/>
-        </p:nvSpPr>
-        <p:spPr bwMode="auto">
-          <a:xfrm>
-            <a:off x="733738" y="4483780"/>
-            <a:ext cx="4259294" cy="156264"/>
-          </a:xfrm>
-          <a:prstGeom prst="rect">
-            <a:avLst/>
-          </a:prstGeom>
-          <a:solidFill>
-            <a:schemeClr val="accent1"/>
-          </a:solidFill>
-          <a:ln w="9525">
-            <a:miter lim="800000"/>
-            <a:headEnd/>
-            <a:tailEnd/>
-          </a:ln>
-          <a:scene3d>
-            <a:camera prst="legacyPerspectiveTop"/>
-            <a:lightRig rig="legacyFlat3" dir="b"/>
-          </a:scene3d>
-          <a:sp3d extrusionH="887400" prstMaterial="legacyMatte">
-            <a:bevelT w="13500" h="13500" prst="angle"/>
-            <a:bevelB w="13500" h="13500" prst="angle"/>
-            <a:extrusionClr>
-              <a:schemeClr val="accent1"/>
-            </a:extrusionClr>
-          </a:sp3d>
-        </p:spPr>
-        <p:txBody>
-          <a:bodyPr wrap="none" anchor="ctr">
-            <a:flatTx/>
-          </a:bodyPr>
-          <a:lstStyle/>
-          <a:p>
-            <a:endParaRPr lang="en-US" sz="2800"/>
-          </a:p>
-        </p:txBody>
-      </p:sp>
-      <p:sp>
-        <p:nvSpPr>
-          <p:cNvPr id="26" name="Rectangle 8"/>
-          <p:cNvSpPr>
-            <a:spLocks noChangeArrowheads="1"/>
-          </p:cNvSpPr>
-          <p:nvPr/>
-        </p:nvSpPr>
-        <p:spPr bwMode="auto">
-          <a:xfrm>
-            <a:off x="3574067" y="3576892"/>
-            <a:ext cx="4259294" cy="156264"/>
-          </a:xfrm>
-          <a:prstGeom prst="rect">
-            <a:avLst/>
-          </a:prstGeom>
-          <a:solidFill>
-            <a:schemeClr val="accent1"/>
-          </a:solidFill>
-          <a:ln w="9525">
-            <a:miter lim="800000"/>
-            <a:headEnd/>
-            <a:tailEnd/>
-          </a:ln>
-          <a:scene3d>
-            <a:camera prst="legacyPerspectiveTop"/>
-            <a:lightRig rig="legacyFlat3" dir="b"/>
-          </a:scene3d>
-          <a:sp3d extrusionH="887400" prstMaterial="legacyMatte">
-            <a:bevelT w="13500" h="13500" prst="angle"/>
-            <a:bevelB w="13500" h="13500" prst="angle"/>
-            <a:extrusionClr>
-              <a:schemeClr val="accent1"/>
-            </a:extrusionClr>
-          </a:sp3d>
-        </p:spPr>
-        <p:txBody>
-          <a:bodyPr wrap="none" anchor="ctr">
-            <a:flatTx/>
-          </a:bodyPr>
-          <a:lstStyle/>
-          <a:p>
-            <a:endParaRPr lang="en-US" sz="2800"/>
-          </a:p>
-        </p:txBody>
-      </p:sp>
-      <p:sp>
-        <p:nvSpPr>
-          <p:cNvPr id="27" name="Line 9"/>
-          <p:cNvSpPr>
-            <a:spLocks noChangeShapeType="1"/>
-          </p:cNvSpPr>
-          <p:nvPr/>
-        </p:nvSpPr>
-        <p:spPr bwMode="auto">
-          <a:xfrm flipV="1">
-            <a:off x="822573" y="2340735"/>
-            <a:ext cx="0" cy="2221176"/>
-          </a:xfrm>
-          <a:prstGeom prst="line">
-            <a:avLst/>
-          </a:prstGeom>
-          <a:noFill/>
-          <a:ln w="9525">
-            <a:solidFill>
-              <a:schemeClr val="tx1"/>
-            </a:solidFill>
-            <a:round/>
-            <a:headEnd/>
-            <a:tailEnd type="triangle" w="med" len="med"/>
-          </a:ln>
-        </p:spPr>
-        <p:txBody>
-          <a:bodyPr wrap="none" anchor="ctr"/>
-          <a:lstStyle/>
-          <a:p>
-            <a:endParaRPr lang="en-US" sz="2800"/>
-          </a:p>
-        </p:txBody>
-      </p:sp>
-      <p:sp>
-        <p:nvSpPr>
-          <p:cNvPr id="28" name="Line 10"/>
-          <p:cNvSpPr>
-            <a:spLocks noChangeShapeType="1"/>
-          </p:cNvSpPr>
-          <p:nvPr/>
-        </p:nvSpPr>
-        <p:spPr bwMode="auto">
-          <a:xfrm flipV="1">
-            <a:off x="832177" y="4573073"/>
-            <a:ext cx="6410549" cy="0"/>
-          </a:xfrm>
-          <a:prstGeom prst="line">
-            <a:avLst/>
-          </a:prstGeom>
-          <a:noFill/>
-          <a:ln w="9525">
-            <a:solidFill>
-              <a:schemeClr val="tx1"/>
-            </a:solidFill>
-            <a:round/>
-            <a:headEnd/>
-            <a:tailEnd type="triangle" w="med" len="med"/>
-          </a:ln>
-        </p:spPr>
-        <p:txBody>
-          <a:bodyPr wrap="none" anchor="ctr"/>
-          <a:lstStyle/>
-          <a:p>
-            <a:endParaRPr lang="en-US" sz="2800"/>
-          </a:p>
-        </p:txBody>
-      </p:sp>
-      <p:sp>
-        <p:nvSpPr>
-          <p:cNvPr id="29" name="Text Box 11"/>
-          <p:cNvSpPr txBox="1">
-            <a:spLocks noChangeArrowheads="1"/>
-          </p:cNvSpPr>
-          <p:nvPr/>
-        </p:nvSpPr>
-        <p:spPr bwMode="auto">
-          <a:xfrm>
-            <a:off x="381001" y="2062981"/>
-            <a:ext cx="345737" cy="524599"/>
-          </a:xfrm>
-          <a:prstGeom prst="rect">
-            <a:avLst/>
-          </a:prstGeom>
-          <a:noFill/>
-          <a:ln w="9525" algn="ctr">
-            <a:noFill/>
-            <a:miter lim="800000"/>
-            <a:headEnd/>
-            <a:tailEnd/>
-          </a:ln>
-        </p:spPr>
-        <p:txBody>
-          <a:bodyPr wrap="none">
-            <a:spAutoFit/>
-          </a:bodyPr>
-          <a:lstStyle/>
-          <a:p>
-            <a:r>
-              <a:rPr lang="en-US" sz="2800" dirty="0"/>
-              <a:t>y</a:t>
-            </a:r>
-          </a:p>
-        </p:txBody>
-      </p:sp>
-      <p:sp>
-        <p:nvSpPr>
-          <p:cNvPr id="30" name="Text Box 12"/>
-          <p:cNvSpPr txBox="1">
-            <a:spLocks noChangeArrowheads="1"/>
-          </p:cNvSpPr>
-          <p:nvPr/>
-        </p:nvSpPr>
-        <p:spPr bwMode="auto">
-          <a:xfrm>
-            <a:off x="7225919" y="4369373"/>
-            <a:ext cx="340936" cy="524599"/>
-          </a:xfrm>
-          <a:prstGeom prst="rect">
-            <a:avLst/>
-          </a:prstGeom>
-          <a:noFill/>
-          <a:ln w="9525" algn="ctr">
-            <a:noFill/>
-            <a:miter lim="800000"/>
-            <a:headEnd/>
-            <a:tailEnd/>
-          </a:ln>
-        </p:spPr>
-        <p:txBody>
-          <a:bodyPr wrap="none">
-            <a:spAutoFit/>
-          </a:bodyPr>
-          <a:lstStyle/>
-          <a:p>
-            <a:r>
-              <a:rPr lang="en-US" sz="2800"/>
-              <a:t>x</a:t>
-            </a:r>
-          </a:p>
-        </p:txBody>
-      </p:sp>
-      <p:sp>
-        <p:nvSpPr>
-          <p:cNvPr id="31" name="Line 13"/>
-          <p:cNvSpPr>
-            <a:spLocks noChangeShapeType="1"/>
-          </p:cNvSpPr>
-          <p:nvPr/>
-        </p:nvSpPr>
-        <p:spPr bwMode="auto">
-          <a:xfrm>
-            <a:off x="5739728" y="2723023"/>
-            <a:ext cx="986792" cy="0"/>
-          </a:xfrm>
-          <a:prstGeom prst="line">
-            <a:avLst/>
-          </a:prstGeom>
-          <a:noFill/>
-          <a:ln w="38100">
-            <a:solidFill>
-              <a:srgbClr val="FF0000"/>
-            </a:solidFill>
-            <a:round/>
-            <a:headEnd/>
-            <a:tailEnd type="triangle" w="med" len="med"/>
-          </a:ln>
-        </p:spPr>
-        <p:txBody>
-          <a:bodyPr wrap="none" anchor="ctr"/>
-          <a:lstStyle/>
-          <a:p>
-            <a:endParaRPr lang="en-US" sz="2800"/>
-          </a:p>
-        </p:txBody>
-      </p:sp>
-      <p:sp>
-        <p:nvSpPr>
-          <p:cNvPr id="32" name="Text Box 14"/>
-          <p:cNvSpPr txBox="1">
-            <a:spLocks noChangeArrowheads="1"/>
-          </p:cNvSpPr>
-          <p:nvPr/>
-        </p:nvSpPr>
-        <p:spPr bwMode="auto">
-          <a:xfrm>
-            <a:off x="6003833" y="1844040"/>
-            <a:ext cx="451380" cy="524599"/>
-          </a:xfrm>
-          <a:prstGeom prst="rect">
-            <a:avLst/>
-          </a:prstGeom>
-          <a:noFill/>
-          <a:ln w="9525" algn="ctr">
-            <a:noFill/>
-            <a:miter lim="800000"/>
-            <a:headEnd/>
-            <a:tailEnd/>
-          </a:ln>
-        </p:spPr>
-        <p:txBody>
-          <a:bodyPr wrap="none">
-            <a:spAutoFit/>
-          </a:bodyPr>
-          <a:lstStyle/>
-          <a:p>
-            <a:r>
-              <a:rPr lang="en-US" sz="2800">
-                <a:solidFill>
-                  <a:srgbClr val="FF0000"/>
-                </a:solidFill>
-              </a:rPr>
-              <a:t>v</a:t>
-            </a:r>
-            <a:r>
-              <a:rPr lang="en-US" sz="2800" baseline="-25000">
-                <a:solidFill>
-                  <a:srgbClr val="FF0000"/>
-                </a:solidFill>
-              </a:rPr>
-              <a:t>x</a:t>
-            </a:r>
-          </a:p>
-        </p:txBody>
-      </p:sp>
-      <p:sp>
-        <p:nvSpPr>
-          <p:cNvPr id="18" name="Oval 16"/>
-          <p:cNvSpPr>
-            <a:spLocks noChangeArrowheads="1"/>
-          </p:cNvSpPr>
-          <p:nvPr/>
-        </p:nvSpPr>
-        <p:spPr bwMode="auto">
-          <a:xfrm flipH="1">
-            <a:off x="7467599" y="2209800"/>
-            <a:ext cx="197686" cy="247204"/>
-          </a:xfrm>
-          <a:prstGeom prst="ellipse">
-            <a:avLst/>
-          </a:prstGeom>
-          <a:solidFill>
-            <a:schemeClr val="tx1"/>
-          </a:solidFill>
-          <a:ln w="9525" algn="ctr">
-            <a:noFill/>
-            <a:round/>
-            <a:headEnd/>
-            <a:tailEnd/>
-          </a:ln>
-        </p:spPr>
-        <p:txBody>
-          <a:bodyPr wrap="none" anchor="ctr"/>
-          <a:lstStyle/>
-          <a:p>
-            <a:endParaRPr lang="en-US" sz="2800"/>
-          </a:p>
-        </p:txBody>
-      </p:sp>
-      <p:sp>
-        <p:nvSpPr>
-          <p:cNvPr id="19" name="Oval 17"/>
-          <p:cNvSpPr>
-            <a:spLocks noChangeArrowheads="1"/>
-          </p:cNvSpPr>
-          <p:nvPr/>
-        </p:nvSpPr>
-        <p:spPr bwMode="auto">
-          <a:xfrm flipH="1">
-            <a:off x="7493348" y="2443520"/>
-            <a:ext cx="166953" cy="533960"/>
-          </a:xfrm>
-          <a:prstGeom prst="ellipse">
-            <a:avLst/>
-          </a:prstGeom>
-          <a:solidFill>
-            <a:schemeClr val="tx1"/>
-          </a:solidFill>
-          <a:ln w="9525" algn="ctr">
-            <a:noFill/>
-            <a:round/>
-            <a:headEnd/>
-            <a:tailEnd/>
-          </a:ln>
-        </p:spPr>
-        <p:txBody>
-          <a:bodyPr wrap="none" anchor="ctr"/>
-          <a:lstStyle/>
-          <a:p>
-            <a:endParaRPr lang="en-US" sz="2800"/>
-          </a:p>
-        </p:txBody>
-      </p:sp>
-      <p:sp>
-        <p:nvSpPr>
-          <p:cNvPr id="20" name="Rectangle 18"/>
-          <p:cNvSpPr>
-            <a:spLocks noChangeArrowheads="1"/>
-          </p:cNvSpPr>
-          <p:nvPr/>
-        </p:nvSpPr>
-        <p:spPr bwMode="auto">
-          <a:xfrm rot="18405958" flipH="1">
-            <a:off x="7663543" y="2439998"/>
-            <a:ext cx="45845" cy="264135"/>
-          </a:xfrm>
-          <a:prstGeom prst="rect">
-            <a:avLst/>
-          </a:prstGeom>
-          <a:solidFill>
-            <a:schemeClr val="tx1"/>
-          </a:solidFill>
-          <a:ln w="9525" algn="ctr">
-            <a:noFill/>
-            <a:miter lim="800000"/>
-            <a:headEnd/>
-            <a:tailEnd/>
-          </a:ln>
-        </p:spPr>
-        <p:txBody>
-          <a:bodyPr wrap="none" anchor="ctr"/>
-          <a:lstStyle/>
-          <a:p>
-            <a:endParaRPr lang="en-US" sz="2800"/>
-          </a:p>
-        </p:txBody>
-      </p:sp>
-      <p:sp>
-        <p:nvSpPr>
-          <p:cNvPr id="21" name="Rectangle 19"/>
-          <p:cNvSpPr>
-            <a:spLocks noChangeArrowheads="1"/>
-          </p:cNvSpPr>
-          <p:nvPr/>
-        </p:nvSpPr>
-        <p:spPr bwMode="auto">
-          <a:xfrm rot="2837193" flipH="1">
-            <a:off x="7658047" y="2602612"/>
-            <a:ext cx="59329" cy="240047"/>
-          </a:xfrm>
-          <a:prstGeom prst="rect">
-            <a:avLst/>
-          </a:prstGeom>
-          <a:solidFill>
-            <a:schemeClr val="tx1"/>
-          </a:solidFill>
-          <a:ln w="9525" algn="ctr">
-            <a:noFill/>
-            <a:miter lim="800000"/>
-            <a:headEnd/>
-            <a:tailEnd/>
-          </a:ln>
-        </p:spPr>
-        <p:txBody>
-          <a:bodyPr wrap="none" anchor="ctr"/>
-          <a:lstStyle/>
-          <a:p>
-            <a:endParaRPr lang="en-US" sz="2800"/>
-          </a:p>
-        </p:txBody>
-      </p:sp>
-      <p:sp>
-        <p:nvSpPr>
-          <p:cNvPr id="22" name="Rectangle 20"/>
-          <p:cNvSpPr>
-            <a:spLocks noChangeArrowheads="1"/>
-          </p:cNvSpPr>
-          <p:nvPr/>
-        </p:nvSpPr>
-        <p:spPr bwMode="auto">
-          <a:xfrm rot="725482" flipH="1">
-            <a:off x="7520758" y="2895678"/>
-            <a:ext cx="78078" cy="304735"/>
-          </a:xfrm>
-          <a:prstGeom prst="rect">
-            <a:avLst/>
-          </a:prstGeom>
-          <a:solidFill>
-            <a:schemeClr val="tx1"/>
-          </a:solidFill>
-          <a:ln w="9525" algn="ctr">
-            <a:noFill/>
-            <a:miter lim="800000"/>
-            <a:headEnd/>
-            <a:tailEnd/>
-          </a:ln>
-        </p:spPr>
-        <p:txBody>
-          <a:bodyPr wrap="none" anchor="ctr"/>
-          <a:lstStyle/>
-          <a:p>
-            <a:endParaRPr lang="en-US" sz="2800"/>
-          </a:p>
-        </p:txBody>
-      </p:sp>
-      <p:sp>
-        <p:nvSpPr>
-          <p:cNvPr id="23" name="Rectangle 21"/>
-          <p:cNvSpPr>
-            <a:spLocks noChangeArrowheads="1"/>
-          </p:cNvSpPr>
-          <p:nvPr/>
-        </p:nvSpPr>
-        <p:spPr bwMode="auto">
-          <a:xfrm rot="20498368" flipH="1">
-            <a:off x="7528234" y="3157264"/>
-            <a:ext cx="78078" cy="304735"/>
-          </a:xfrm>
-          <a:prstGeom prst="rect">
-            <a:avLst/>
-          </a:prstGeom>
-          <a:solidFill>
-            <a:schemeClr val="tx1"/>
-          </a:solidFill>
-          <a:ln w="9525" algn="ctr">
-            <a:noFill/>
-            <a:miter lim="800000"/>
-            <a:headEnd/>
-            <a:tailEnd/>
-          </a:ln>
-        </p:spPr>
-        <p:txBody>
-          <a:bodyPr wrap="none" anchor="ctr"/>
-          <a:lstStyle/>
-          <a:p>
-            <a:endParaRPr lang="en-US" sz="2800"/>
-          </a:p>
-        </p:txBody>
-      </p:sp>
-      <p:sp>
-        <p:nvSpPr>
-          <p:cNvPr id="24" name="Rectangle 22"/>
-          <p:cNvSpPr>
-            <a:spLocks noChangeArrowheads="1"/>
-          </p:cNvSpPr>
-          <p:nvPr/>
-        </p:nvSpPr>
-        <p:spPr bwMode="auto">
-          <a:xfrm flipH="1">
-            <a:off x="7486703" y="3422447"/>
-            <a:ext cx="161970" cy="64722"/>
-          </a:xfrm>
-          <a:prstGeom prst="rect">
-            <a:avLst/>
-          </a:prstGeom>
-          <a:solidFill>
-            <a:schemeClr val="tx1"/>
-          </a:solidFill>
-          <a:ln w="9525" algn="ctr">
-            <a:noFill/>
-            <a:miter lim="800000"/>
-            <a:headEnd/>
-            <a:tailEnd/>
-          </a:ln>
-        </p:spPr>
-        <p:txBody>
-          <a:bodyPr wrap="none" anchor="ctr"/>
-          <a:lstStyle/>
-          <a:p>
-            <a:endParaRPr lang="en-US" sz="2800"/>
-          </a:p>
-        </p:txBody>
-      </p:sp>
-      <p:grpSp>
-        <p:nvGrpSpPr>
-          <p:cNvPr id="2" name="Group 23"/>
-          <p:cNvGrpSpPr>
-            <a:grpSpLocks/>
-          </p:cNvGrpSpPr>
-          <p:nvPr/>
-        </p:nvGrpSpPr>
-        <p:grpSpPr bwMode="auto">
-          <a:xfrm>
-            <a:off x="1249680" y="3017520"/>
-            <a:ext cx="396240" cy="1363014"/>
-            <a:chOff x="4491" y="2017"/>
-            <a:chExt cx="422" cy="1421"/>
-          </a:xfrm>
-        </p:grpSpPr>
-        <p:sp>
-          <p:nvSpPr>
-            <p:cNvPr id="11" name="Oval 24"/>
-            <p:cNvSpPr>
-              <a:spLocks noChangeArrowheads="1"/>
-            </p:cNvSpPr>
-            <p:nvPr/>
-          </p:nvSpPr>
-          <p:spPr bwMode="auto">
-            <a:xfrm>
-              <a:off x="4675" y="2017"/>
-              <a:ext cx="238" cy="275"/>
-            </a:xfrm>
-            <a:prstGeom prst="ellipse">
-              <a:avLst/>
-            </a:prstGeom>
-            <a:solidFill>
-              <a:schemeClr val="tx1"/>
-            </a:solidFill>
-            <a:ln w="9525" algn="ctr">
-              <a:noFill/>
-              <a:round/>
-              <a:headEnd/>
-              <a:tailEnd/>
-            </a:ln>
-          </p:spPr>
-          <p:txBody>
-            <a:bodyPr wrap="none" anchor="ctr"/>
-            <a:lstStyle/>
-            <a:p>
-              <a:endParaRPr lang="en-US" sz="2800"/>
-            </a:p>
-          </p:txBody>
-        </p:sp>
-        <p:sp>
-          <p:nvSpPr>
-            <p:cNvPr id="12" name="Oval 25"/>
-            <p:cNvSpPr>
-              <a:spLocks noChangeArrowheads="1"/>
-            </p:cNvSpPr>
-            <p:nvPr/>
-          </p:nvSpPr>
-          <p:spPr bwMode="auto">
-            <a:xfrm>
-              <a:off x="4681" y="2277"/>
-              <a:ext cx="201" cy="594"/>
-            </a:xfrm>
-            <a:prstGeom prst="ellipse">
-              <a:avLst/>
-            </a:prstGeom>
-            <a:solidFill>
-              <a:schemeClr val="tx1"/>
-            </a:solidFill>
-            <a:ln w="9525" algn="ctr">
-              <a:noFill/>
-              <a:round/>
-              <a:headEnd/>
-              <a:tailEnd/>
-            </a:ln>
-          </p:spPr>
-          <p:txBody>
-            <a:bodyPr wrap="none" anchor="ctr"/>
-            <a:lstStyle/>
-            <a:p>
-              <a:endParaRPr lang="en-US" sz="2800"/>
-            </a:p>
-          </p:txBody>
-        </p:sp>
-        <p:sp>
-          <p:nvSpPr>
-            <p:cNvPr id="13" name="Rectangle 26"/>
-            <p:cNvSpPr>
-              <a:spLocks noChangeArrowheads="1"/>
-            </p:cNvSpPr>
-            <p:nvPr/>
-          </p:nvSpPr>
-          <p:spPr bwMode="auto">
-            <a:xfrm rot="3194042">
-              <a:off x="4624" y="2261"/>
-              <a:ext cx="51" cy="318"/>
-            </a:xfrm>
-            <a:prstGeom prst="rect">
-              <a:avLst/>
-            </a:prstGeom>
-            <a:solidFill>
-              <a:schemeClr val="tx1"/>
-            </a:solidFill>
-            <a:ln w="9525" algn="ctr">
-              <a:noFill/>
-              <a:miter lim="800000"/>
-              <a:headEnd/>
-              <a:tailEnd/>
-            </a:ln>
-          </p:spPr>
-          <p:txBody>
-            <a:bodyPr wrap="none" anchor="ctr"/>
-            <a:lstStyle/>
-            <a:p>
-              <a:endParaRPr lang="en-US" sz="2800"/>
-            </a:p>
-          </p:txBody>
-        </p:sp>
-        <p:sp>
-          <p:nvSpPr>
-            <p:cNvPr id="14" name="Rectangle 27"/>
-            <p:cNvSpPr>
-              <a:spLocks noChangeArrowheads="1"/>
-            </p:cNvSpPr>
-            <p:nvPr/>
-          </p:nvSpPr>
-          <p:spPr bwMode="auto">
-            <a:xfrm rot="-2837193">
-              <a:off x="4615" y="2443"/>
-              <a:ext cx="66" cy="289"/>
-            </a:xfrm>
-            <a:prstGeom prst="rect">
-              <a:avLst/>
-            </a:prstGeom>
-            <a:solidFill>
-              <a:schemeClr val="tx1"/>
-            </a:solidFill>
-            <a:ln w="9525" algn="ctr">
-              <a:noFill/>
-              <a:miter lim="800000"/>
-              <a:headEnd/>
-              <a:tailEnd/>
-            </a:ln>
-          </p:spPr>
-          <p:txBody>
-            <a:bodyPr wrap="none" anchor="ctr"/>
-            <a:lstStyle/>
-            <a:p>
-              <a:endParaRPr lang="en-US" sz="2800"/>
-            </a:p>
-          </p:txBody>
-        </p:sp>
-        <p:sp>
-          <p:nvSpPr>
-            <p:cNvPr id="15" name="Rectangle 28"/>
-            <p:cNvSpPr>
-              <a:spLocks noChangeArrowheads="1"/>
-            </p:cNvSpPr>
-            <p:nvPr/>
-          </p:nvSpPr>
-          <p:spPr bwMode="auto">
-            <a:xfrm rot="-725482">
-              <a:off x="4755" y="2780"/>
-              <a:ext cx="94" cy="339"/>
-            </a:xfrm>
-            <a:prstGeom prst="rect">
-              <a:avLst/>
-            </a:prstGeom>
-            <a:solidFill>
-              <a:schemeClr val="tx1"/>
-            </a:solidFill>
-            <a:ln w="9525" algn="ctr">
-              <a:noFill/>
-              <a:miter lim="800000"/>
-              <a:headEnd/>
-              <a:tailEnd/>
-            </a:ln>
-          </p:spPr>
-          <p:txBody>
-            <a:bodyPr wrap="none" anchor="ctr"/>
-            <a:lstStyle/>
-            <a:p>
-              <a:endParaRPr lang="en-US" sz="2800"/>
-            </a:p>
-          </p:txBody>
-        </p:sp>
-        <p:sp>
-          <p:nvSpPr>
-            <p:cNvPr id="16" name="Rectangle 29"/>
-            <p:cNvSpPr>
-              <a:spLocks noChangeArrowheads="1"/>
-            </p:cNvSpPr>
-            <p:nvPr/>
-          </p:nvSpPr>
-          <p:spPr bwMode="auto">
-            <a:xfrm rot="1101632">
-              <a:off x="4746" y="3071"/>
-              <a:ext cx="94" cy="339"/>
-            </a:xfrm>
-            <a:prstGeom prst="rect">
-              <a:avLst/>
-            </a:prstGeom>
-            <a:solidFill>
-              <a:schemeClr val="tx1"/>
-            </a:solidFill>
-            <a:ln w="9525" algn="ctr">
-              <a:noFill/>
-              <a:miter lim="800000"/>
-              <a:headEnd/>
-              <a:tailEnd/>
-            </a:ln>
-          </p:spPr>
-          <p:txBody>
-            <a:bodyPr wrap="none" anchor="ctr"/>
-            <a:lstStyle/>
-            <a:p>
-              <a:endParaRPr lang="en-US" sz="2800"/>
-            </a:p>
-          </p:txBody>
-        </p:sp>
-        <p:sp>
-          <p:nvSpPr>
-            <p:cNvPr id="17" name="Rectangle 30"/>
-            <p:cNvSpPr>
-              <a:spLocks noChangeArrowheads="1"/>
-            </p:cNvSpPr>
-            <p:nvPr/>
-          </p:nvSpPr>
-          <p:spPr bwMode="auto">
-            <a:xfrm>
-              <a:off x="4695" y="3366"/>
-              <a:ext cx="195" cy="72"/>
-            </a:xfrm>
-            <a:prstGeom prst="rect">
-              <a:avLst/>
-            </a:prstGeom>
-            <a:solidFill>
-              <a:schemeClr val="tx1"/>
-            </a:solidFill>
-            <a:ln w="9525" algn="ctr">
-              <a:noFill/>
-              <a:miter lim="800000"/>
-              <a:headEnd/>
-              <a:tailEnd/>
-            </a:ln>
-          </p:spPr>
-          <p:txBody>
-            <a:bodyPr wrap="none" anchor="ctr"/>
-            <a:lstStyle/>
-            <a:p>
-              <a:endParaRPr lang="en-US" sz="2800"/>
-            </a:p>
-          </p:txBody>
-        </p:sp>
-      </p:grpSp>
-      <p:sp>
-        <p:nvSpPr>
-          <p:cNvPr id="6" name="Text Box 31"/>
-          <p:cNvSpPr txBox="1">
-            <a:spLocks noChangeArrowheads="1"/>
-          </p:cNvSpPr>
-          <p:nvPr/>
-        </p:nvSpPr>
-        <p:spPr bwMode="auto">
-          <a:xfrm>
-            <a:off x="2314323" y="4653566"/>
-            <a:ext cx="350539" cy="524599"/>
-          </a:xfrm>
-          <a:prstGeom prst="rect">
-            <a:avLst/>
-          </a:prstGeom>
-          <a:noFill/>
-          <a:ln w="9525" algn="ctr">
-            <a:noFill/>
-            <a:miter lim="800000"/>
-            <a:headEnd/>
-            <a:tailEnd/>
-          </a:ln>
-        </p:spPr>
-        <p:txBody>
-          <a:bodyPr wrap="none">
-            <a:spAutoFit/>
-          </a:bodyPr>
-          <a:lstStyle/>
-          <a:p>
-            <a:r>
-              <a:rPr lang="en-US" sz="2800" dirty="0"/>
-              <a:t>S</a:t>
-            </a:r>
-          </a:p>
-        </p:txBody>
-      </p:sp>
-      <p:sp>
-        <p:nvSpPr>
-          <p:cNvPr id="7" name="Text Box 32"/>
-          <p:cNvSpPr txBox="1">
-            <a:spLocks noChangeArrowheads="1"/>
-          </p:cNvSpPr>
-          <p:nvPr/>
-        </p:nvSpPr>
-        <p:spPr bwMode="auto">
-          <a:xfrm>
-            <a:off x="5436500" y="3719633"/>
-            <a:ext cx="436974" cy="524599"/>
-          </a:xfrm>
-          <a:prstGeom prst="rect">
-            <a:avLst/>
-          </a:prstGeom>
-          <a:noFill/>
-          <a:ln w="9525" algn="ctr">
-            <a:noFill/>
-            <a:miter lim="800000"/>
-            <a:headEnd/>
-            <a:tailEnd/>
-          </a:ln>
-        </p:spPr>
-        <p:txBody>
-          <a:bodyPr wrap="none">
-            <a:spAutoFit/>
-          </a:bodyPr>
-          <a:lstStyle/>
-          <a:p>
-            <a:r>
-              <a:rPr lang="en-US" sz="2800" dirty="0"/>
-              <a:t>S’</a:t>
-            </a:r>
-          </a:p>
-        </p:txBody>
-      </p:sp>
-      <p:sp>
-        <p:nvSpPr>
-          <p:cNvPr id="33" name="Line 9"/>
-          <p:cNvSpPr>
-            <a:spLocks noChangeShapeType="1"/>
-          </p:cNvSpPr>
-          <p:nvPr/>
-        </p:nvSpPr>
-        <p:spPr bwMode="auto">
-          <a:xfrm flipV="1">
-            <a:off x="3596253" y="1411095"/>
-            <a:ext cx="0" cy="2221176"/>
-          </a:xfrm>
-          <a:prstGeom prst="line">
-            <a:avLst/>
-          </a:prstGeom>
-          <a:noFill/>
-          <a:ln w="9525">
-            <a:solidFill>
-              <a:schemeClr val="tx1"/>
-            </a:solidFill>
-            <a:round/>
-            <a:headEnd/>
-            <a:tailEnd type="triangle" w="med" len="med"/>
-          </a:ln>
-        </p:spPr>
-        <p:txBody>
-          <a:bodyPr wrap="none" anchor="ctr"/>
-          <a:lstStyle/>
-          <a:p>
-            <a:endParaRPr lang="en-US" sz="2800"/>
-          </a:p>
-        </p:txBody>
-      </p:sp>
-      <p:sp>
-        <p:nvSpPr>
-          <p:cNvPr id="34" name="Line 10"/>
-          <p:cNvSpPr>
-            <a:spLocks noChangeShapeType="1"/>
-          </p:cNvSpPr>
-          <p:nvPr/>
-        </p:nvSpPr>
-        <p:spPr bwMode="auto">
-          <a:xfrm flipV="1">
-            <a:off x="3605857" y="3642360"/>
-            <a:ext cx="5050463" cy="1073"/>
-          </a:xfrm>
-          <a:prstGeom prst="line">
-            <a:avLst/>
-          </a:prstGeom>
-          <a:noFill/>
-          <a:ln w="9525">
-            <a:solidFill>
-              <a:schemeClr val="tx1"/>
-            </a:solidFill>
-            <a:round/>
-            <a:headEnd/>
-            <a:tailEnd type="triangle" w="med" len="med"/>
-          </a:ln>
-        </p:spPr>
-        <p:txBody>
-          <a:bodyPr wrap="none" anchor="ctr"/>
-          <a:lstStyle/>
-          <a:p>
-            <a:endParaRPr lang="en-US" sz="2800"/>
-          </a:p>
-        </p:txBody>
-      </p:sp>
-      <p:sp>
-        <p:nvSpPr>
-          <p:cNvPr id="35" name="Text Box 11"/>
-          <p:cNvSpPr txBox="1">
-            <a:spLocks noChangeArrowheads="1"/>
-          </p:cNvSpPr>
-          <p:nvPr/>
-        </p:nvSpPr>
-        <p:spPr bwMode="auto">
-          <a:xfrm>
-            <a:off x="3154681" y="1133341"/>
-            <a:ext cx="453714" cy="523220"/>
-          </a:xfrm>
-          <a:prstGeom prst="rect">
-            <a:avLst/>
-          </a:prstGeom>
-          <a:noFill/>
-          <a:ln w="9525" algn="ctr">
-            <a:noFill/>
-            <a:miter lim="800000"/>
-            <a:headEnd/>
-            <a:tailEnd/>
-          </a:ln>
-        </p:spPr>
-        <p:txBody>
-          <a:bodyPr wrap="none">
-            <a:spAutoFit/>
-          </a:bodyPr>
-          <a:lstStyle/>
-          <a:p>
-            <a:r>
-              <a:rPr lang="en-US" sz="2800" dirty="0"/>
-              <a:t>y’</a:t>
-            </a:r>
-          </a:p>
-        </p:txBody>
-      </p:sp>
-      <p:sp>
-        <p:nvSpPr>
-          <p:cNvPr id="36" name="Text Box 12"/>
-          <p:cNvSpPr txBox="1">
-            <a:spLocks noChangeArrowheads="1"/>
-          </p:cNvSpPr>
-          <p:nvPr/>
-        </p:nvSpPr>
-        <p:spPr bwMode="auto">
-          <a:xfrm>
-            <a:off x="8094599" y="3668333"/>
-            <a:ext cx="438838" cy="523220"/>
-          </a:xfrm>
-          <a:prstGeom prst="rect">
-            <a:avLst/>
-          </a:prstGeom>
-          <a:noFill/>
-          <a:ln w="9525" algn="ctr">
-            <a:noFill/>
-            <a:miter lim="800000"/>
-            <a:headEnd/>
-            <a:tailEnd/>
-          </a:ln>
-        </p:spPr>
-        <p:txBody>
-          <a:bodyPr wrap="none">
-            <a:spAutoFit/>
-          </a:bodyPr>
-          <a:lstStyle/>
-          <a:p>
-            <a:r>
-              <a:rPr lang="en-US" sz="2800" dirty="0"/>
-              <a:t>x’</a:t>
-            </a:r>
-          </a:p>
-        </p:txBody>
-      </p:sp>
     </p:spTree>
   </p:cSld>
   <p:clrMapOvr>

</xml_diff>